<commit_message>
add excercises for module1
</commit_message>
<xml_diff>
--- a/curriculum.pptx
+++ b/curriculum.pptx
@@ -496,7 +496,7 @@
           <a:p>
             <a:fld id="{9F28C9D7-B293-4C2E-90CE-AC031540AB14}" type="datetimeFigureOut">
               <a:rPr lang="en-IN" smtClean="0"/>
-              <a:t>17-12-2021</a:t>
+              <a:t>20-12-2021</a:t>
             </a:fld>
             <a:endParaRPr lang="en-IN"/>
           </a:p>
@@ -661,7 +661,7 @@
           <a:p>
             <a:fld id="{9F28C9D7-B293-4C2E-90CE-AC031540AB14}" type="datetimeFigureOut">
               <a:rPr lang="en-IN" smtClean="0"/>
-              <a:t>17-12-2021</a:t>
+              <a:t>20-12-2021</a:t>
             </a:fld>
             <a:endParaRPr lang="en-IN"/>
           </a:p>
@@ -836,7 +836,7 @@
           <a:p>
             <a:fld id="{9F28C9D7-B293-4C2E-90CE-AC031540AB14}" type="datetimeFigureOut">
               <a:rPr lang="en-IN" smtClean="0"/>
-              <a:t>17-12-2021</a:t>
+              <a:t>20-12-2021</a:t>
             </a:fld>
             <a:endParaRPr lang="en-IN"/>
           </a:p>
@@ -1005,7 +1005,7 @@
           <a:p>
             <a:fld id="{9F28C9D7-B293-4C2E-90CE-AC031540AB14}" type="datetimeFigureOut">
               <a:rPr lang="en-IN" smtClean="0"/>
-              <a:t>17-12-2021</a:t>
+              <a:t>20-12-2021</a:t>
             </a:fld>
             <a:endParaRPr lang="en-IN"/>
           </a:p>
@@ -1460,7 +1460,7 @@
           <a:p>
             <a:fld id="{9F28C9D7-B293-4C2E-90CE-AC031540AB14}" type="datetimeFigureOut">
               <a:rPr lang="en-IN" smtClean="0"/>
-              <a:t>17-12-2021</a:t>
+              <a:t>20-12-2021</a:t>
             </a:fld>
             <a:endParaRPr lang="en-IN"/>
           </a:p>
@@ -1724,7 +1724,7 @@
           <a:p>
             <a:fld id="{9F28C9D7-B293-4C2E-90CE-AC031540AB14}" type="datetimeFigureOut">
               <a:rPr lang="en-IN" smtClean="0"/>
-              <a:t>17-12-2021</a:t>
+              <a:t>20-12-2021</a:t>
             </a:fld>
             <a:endParaRPr lang="en-IN"/>
           </a:p>
@@ -2098,7 +2098,7 @@
           <a:p>
             <a:fld id="{9F28C9D7-B293-4C2E-90CE-AC031540AB14}" type="datetimeFigureOut">
               <a:rPr lang="en-IN" smtClean="0"/>
-              <a:t>17-12-2021</a:t>
+              <a:t>20-12-2021</a:t>
             </a:fld>
             <a:endParaRPr lang="en-IN"/>
           </a:p>
@@ -2220,7 +2220,7 @@
           <a:p>
             <a:fld id="{9F28C9D7-B293-4C2E-90CE-AC031540AB14}" type="datetimeFigureOut">
               <a:rPr lang="en-IN" smtClean="0"/>
-              <a:t>17-12-2021</a:t>
+              <a:t>20-12-2021</a:t>
             </a:fld>
             <a:endParaRPr lang="en-IN"/>
           </a:p>
@@ -2310,7 +2310,7 @@
           <a:p>
             <a:fld id="{9F28C9D7-B293-4C2E-90CE-AC031540AB14}" type="datetimeFigureOut">
               <a:rPr lang="en-IN" smtClean="0"/>
-              <a:t>17-12-2021</a:t>
+              <a:t>20-12-2021</a:t>
             </a:fld>
             <a:endParaRPr lang="en-IN"/>
           </a:p>
@@ -2559,7 +2559,7 @@
           <a:p>
             <a:fld id="{9F28C9D7-B293-4C2E-90CE-AC031540AB14}" type="datetimeFigureOut">
               <a:rPr lang="en-IN" smtClean="0"/>
-              <a:t>17-12-2021</a:t>
+              <a:t>20-12-2021</a:t>
             </a:fld>
             <a:endParaRPr lang="en-IN"/>
           </a:p>
@@ -2818,7 +2818,7 @@
           <a:p>
             <a:fld id="{9F28C9D7-B293-4C2E-90CE-AC031540AB14}" type="datetimeFigureOut">
               <a:rPr lang="en-IN" smtClean="0"/>
-              <a:t>17-12-2021</a:t>
+              <a:t>20-12-2021</a:t>
             </a:fld>
             <a:endParaRPr lang="en-IN"/>
           </a:p>
@@ -3222,7 +3222,7 @@
           <a:p>
             <a:fld id="{9F28C9D7-B293-4C2E-90CE-AC031540AB14}" type="datetimeFigureOut">
               <a:rPr lang="en-IN" smtClean="0"/>
-              <a:t>17-12-2021</a:t>
+              <a:t>20-12-2021</a:t>
             </a:fld>
             <a:endParaRPr lang="en-IN"/>
           </a:p>
@@ -3799,7 +3799,6 @@
               <a:rPr lang="en-US" sz="1800" dirty="0" smtClean="0"/>
               <a:t>Comments &amp; Indentation</a:t>
             </a:r>
-            <a:endParaRPr lang="en-US" sz="1800" dirty="0" smtClean="0"/>
           </a:p>
           <a:p>
             <a:pPr lvl="1"/>
@@ -3814,7 +3813,6 @@
               <a:rPr lang="en-US" sz="1800" dirty="0" smtClean="0"/>
               <a:t>Data Types</a:t>
             </a:r>
-            <a:endParaRPr lang="en-US" sz="1800" dirty="0" smtClean="0"/>
           </a:p>
           <a:p>
             <a:pPr lvl="1"/>
@@ -4351,11 +4349,7 @@
           <a:p>
             <a:r>
               <a:rPr lang="en-US" sz="2600" b="1" dirty="0" smtClean="0"/>
-              <a:t>Data </a:t>
-            </a:r>
-            <a:r>
-              <a:rPr lang="en-US" sz="2600" b="1" dirty="0" smtClean="0"/>
-              <a:t>Collections (Lists</a:t>
+              <a:t>Data Collections (Lists</a:t>
             </a:r>
             <a:r>
               <a:rPr lang="en-US" sz="2600" b="1" dirty="0"/>

</xml_diff>